<commit_message>
add  use case and update presentation
</commit_message>
<xml_diff>
--- a/src/Additional/Presentation/PresentationAirlineReservationSystem.pptx
+++ b/src/Additional/Presentation/PresentationAirlineReservationSystem.pptx
@@ -12841,7 +12841,7 @@
             </a:r>
             <a:r>
               <a:rPr lang="fr-FR" sz="4400" dirty="0" err="1"/>
-              <a:t>Titled</a:t>
+              <a:t>Title</a:t>
             </a:r>
             <a:r>
               <a:rPr lang="fr-FR" sz="4000" dirty="0"/>
@@ -13579,10 +13579,10 @@
       </p:grpSp>
       <p:pic>
         <p:nvPicPr>
-          <p:cNvPr id="5" name="Content Placeholder 4" descr="Diagram&#10;&#10;Description automatically generated">
+          <p:cNvPr id="6" name="Content Placeholder 5" descr="Diagram&#10;&#10;Description automatically generated">
             <a:extLst>
               <a:ext uri="{FF2B5EF4-FFF2-40B4-BE49-F238E27FC236}">
-                <a16:creationId xmlns:a16="http://schemas.microsoft.com/office/drawing/2014/main" id="{C904553B-3F26-44DF-B561-A2DA063ADEF2}"/>
+                <a16:creationId xmlns:a16="http://schemas.microsoft.com/office/drawing/2014/main" id="{7C79DAD0-8F6F-4E5B-8C79-37CD9664038F}"/>
               </a:ext>
             </a:extLst>
           </p:cNvPr>
@@ -13593,7 +13593,7 @@
             <p:ph idx="1"/>
           </p:nvPr>
         </p:nvPicPr>
-        <p:blipFill rotWithShape="1">
+        <p:blipFill>
           <a:blip r:embed="rId3">
             <a:extLst>
               <a:ext uri="{28A0092B-C50C-407E-A947-70E740481C1C}">
@@ -13601,17 +13601,15 @@
               </a:ext>
             </a:extLst>
           </a:blip>
-          <a:srcRect l="6414" r="22919"/>
-          <a:stretch/>
+          <a:stretch>
+            <a:fillRect/>
+          </a:stretch>
         </p:blipFill>
         <p:spPr>
           <a:xfrm>
-            <a:off x="20" y="10"/>
-            <a:ext cx="12191980" cy="6857990"/>
+            <a:off x="-1" y="19049"/>
+            <a:ext cx="12289135" cy="6838951"/>
           </a:xfrm>
-          <a:prstGeom prst="rect">
-            <a:avLst/>
-          </a:prstGeom>
         </p:spPr>
       </p:pic>
     </p:spTree>

</xml_diff>